<commit_message>
MS update of nodes
</commit_message>
<xml_diff>
--- a/outputs/legend_nrefs_paper.pptx
+++ b/outputs/legend_nrefs_paper.pptx
@@ -311,7 +311,7 @@
           <a:p>
             <a:fld id="{6BA5D40C-A8DC-479A-A5D3-E7B4936A184B}" type="datetimeFigureOut">
               <a:rPr lang="en-GB" smtClean="0"/>
-              <a:t>03/09/2020</a:t>
+              <a:t>06/10/2020</a:t>
             </a:fld>
             <a:endParaRPr lang="en-GB"/>
           </a:p>
@@ -481,7 +481,7 @@
           <a:p>
             <a:fld id="{6BA5D40C-A8DC-479A-A5D3-E7B4936A184B}" type="datetimeFigureOut">
               <a:rPr lang="en-GB" smtClean="0"/>
-              <a:t>03/09/2020</a:t>
+              <a:t>06/10/2020</a:t>
             </a:fld>
             <a:endParaRPr lang="en-GB"/>
           </a:p>
@@ -661,7 +661,7 @@
           <a:p>
             <a:fld id="{6BA5D40C-A8DC-479A-A5D3-E7B4936A184B}" type="datetimeFigureOut">
               <a:rPr lang="en-GB" smtClean="0"/>
-              <a:t>03/09/2020</a:t>
+              <a:t>06/10/2020</a:t>
             </a:fld>
             <a:endParaRPr lang="en-GB"/>
           </a:p>
@@ -831,7 +831,7 @@
           <a:p>
             <a:fld id="{6BA5D40C-A8DC-479A-A5D3-E7B4936A184B}" type="datetimeFigureOut">
               <a:rPr lang="en-GB" smtClean="0"/>
-              <a:t>03/09/2020</a:t>
+              <a:t>06/10/2020</a:t>
             </a:fld>
             <a:endParaRPr lang="en-GB"/>
           </a:p>
@@ -1077,7 +1077,7 @@
           <a:p>
             <a:fld id="{6BA5D40C-A8DC-479A-A5D3-E7B4936A184B}" type="datetimeFigureOut">
               <a:rPr lang="en-GB" smtClean="0"/>
-              <a:t>03/09/2020</a:t>
+              <a:t>06/10/2020</a:t>
             </a:fld>
             <a:endParaRPr lang="en-GB"/>
           </a:p>
@@ -1365,7 +1365,7 @@
           <a:p>
             <a:fld id="{6BA5D40C-A8DC-479A-A5D3-E7B4936A184B}" type="datetimeFigureOut">
               <a:rPr lang="en-GB" smtClean="0"/>
-              <a:t>03/09/2020</a:t>
+              <a:t>06/10/2020</a:t>
             </a:fld>
             <a:endParaRPr lang="en-GB"/>
           </a:p>
@@ -1792,7 +1792,7 @@
           <a:p>
             <a:fld id="{6BA5D40C-A8DC-479A-A5D3-E7B4936A184B}" type="datetimeFigureOut">
               <a:rPr lang="en-GB" smtClean="0"/>
-              <a:t>03/09/2020</a:t>
+              <a:t>06/10/2020</a:t>
             </a:fld>
             <a:endParaRPr lang="en-GB"/>
           </a:p>
@@ -1910,7 +1910,7 @@
           <a:p>
             <a:fld id="{6BA5D40C-A8DC-479A-A5D3-E7B4936A184B}" type="datetimeFigureOut">
               <a:rPr lang="en-GB" smtClean="0"/>
-              <a:t>03/09/2020</a:t>
+              <a:t>06/10/2020</a:t>
             </a:fld>
             <a:endParaRPr lang="en-GB"/>
           </a:p>
@@ -2005,7 +2005,7 @@
           <a:p>
             <a:fld id="{6BA5D40C-A8DC-479A-A5D3-E7B4936A184B}" type="datetimeFigureOut">
               <a:rPr lang="en-GB" smtClean="0"/>
-              <a:t>03/09/2020</a:t>
+              <a:t>06/10/2020</a:t>
             </a:fld>
             <a:endParaRPr lang="en-GB"/>
           </a:p>
@@ -2282,7 +2282,7 @@
           <a:p>
             <a:fld id="{6BA5D40C-A8DC-479A-A5D3-E7B4936A184B}" type="datetimeFigureOut">
               <a:rPr lang="en-GB" smtClean="0"/>
-              <a:t>03/09/2020</a:t>
+              <a:t>06/10/2020</a:t>
             </a:fld>
             <a:endParaRPr lang="en-GB"/>
           </a:p>
@@ -2535,7 +2535,7 @@
           <a:p>
             <a:fld id="{6BA5D40C-A8DC-479A-A5D3-E7B4936A184B}" type="datetimeFigureOut">
               <a:rPr lang="en-GB" smtClean="0"/>
-              <a:t>03/09/2020</a:t>
+              <a:t>06/10/2020</a:t>
             </a:fld>
             <a:endParaRPr lang="en-GB"/>
           </a:p>
@@ -2748,7 +2748,7 @@
           <a:p>
             <a:fld id="{6BA5D40C-A8DC-479A-A5D3-E7B4936A184B}" type="datetimeFigureOut">
               <a:rPr lang="en-GB" smtClean="0"/>
-              <a:t>03/09/2020</a:t>
+              <a:t>06/10/2020</a:t>
             </a:fld>
             <a:endParaRPr lang="en-GB"/>
           </a:p>
@@ -6411,6 +6411,725 @@
           </p:sp>
         </p:grpSp>
       </p:grpSp>
+      <p:grpSp>
+        <p:nvGrpSpPr>
+          <p:cNvPr id="16" name="Group 15">
+            <a:extLst>
+              <a:ext uri="{FF2B5EF4-FFF2-40B4-BE49-F238E27FC236}">
+                <a16:creationId xmlns:a16="http://schemas.microsoft.com/office/drawing/2014/main" id="{954CF246-4ED4-451B-A6C5-C924D976B62E}"/>
+              </a:ext>
+            </a:extLst>
+          </p:cNvPr>
+          <p:cNvGrpSpPr/>
+          <p:nvPr/>
+        </p:nvGrpSpPr>
+        <p:grpSpPr>
+          <a:xfrm>
+            <a:off x="1419225" y="1483030"/>
+            <a:ext cx="1024976" cy="1532477"/>
+            <a:chOff x="3343061" y="1650718"/>
+            <a:chExt cx="1024976" cy="1532477"/>
+          </a:xfrm>
+        </p:grpSpPr>
+        <p:sp>
+          <p:nvSpPr>
+            <p:cNvPr id="17" name="pt10">
+              <a:extLst>
+                <a:ext uri="{FF2B5EF4-FFF2-40B4-BE49-F238E27FC236}">
+                  <a16:creationId xmlns:a16="http://schemas.microsoft.com/office/drawing/2014/main" id="{1200EF15-33DD-4C85-9B09-2A5C9B716884}"/>
+                </a:ext>
+              </a:extLst>
+            </p:cNvPr>
+            <p:cNvSpPr/>
+            <p:nvPr/>
+          </p:nvSpPr>
+          <p:spPr>
+            <a:xfrm>
+              <a:off x="3391204" y="3038689"/>
+              <a:ext cx="144506" cy="144506"/>
+            </a:xfrm>
+            <a:prstGeom prst="ellipse">
+              <a:avLst/>
+            </a:prstGeom>
+            <a:solidFill>
+              <a:srgbClr val="E6F598">
+                <a:alpha val="100000"/>
+              </a:srgbClr>
+            </a:solidFill>
+            <a:ln w="9000" cap="rnd">
+              <a:solidFill>
+                <a:srgbClr val="E6F598">
+                  <a:alpha val="100000"/>
+                </a:srgbClr>
+              </a:solidFill>
+              <a:prstDash val="solid"/>
+              <a:round/>
+            </a:ln>
+          </p:spPr>
+          <p:txBody>
+            <a:bodyPr/>
+            <a:lstStyle/>
+            <a:p>
+              <a:endParaRPr/>
+            </a:p>
+          </p:txBody>
+        </p:sp>
+        <p:sp>
+          <p:nvSpPr>
+            <p:cNvPr id="18" name="pt14">
+              <a:extLst>
+                <a:ext uri="{FF2B5EF4-FFF2-40B4-BE49-F238E27FC236}">
+                  <a16:creationId xmlns:a16="http://schemas.microsoft.com/office/drawing/2014/main" id="{E062FEE2-5D75-4CEB-8F9E-D9E56A6E1FCD}"/>
+                </a:ext>
+              </a:extLst>
+            </p:cNvPr>
+            <p:cNvSpPr/>
+            <p:nvPr/>
+          </p:nvSpPr>
+          <p:spPr>
+            <a:xfrm>
+              <a:off x="3343061" y="2139970"/>
+              <a:ext cx="252000" cy="252000"/>
+            </a:xfrm>
+            <a:prstGeom prst="ellipse">
+              <a:avLst/>
+            </a:prstGeom>
+            <a:solidFill>
+              <a:srgbClr val="D53E4F">
+                <a:alpha val="100000"/>
+              </a:srgbClr>
+            </a:solidFill>
+            <a:ln w="9000" cap="rnd">
+              <a:solidFill>
+                <a:srgbClr val="D53E4F">
+                  <a:alpha val="100000"/>
+                </a:srgbClr>
+              </a:solidFill>
+              <a:prstDash val="solid"/>
+              <a:round/>
+            </a:ln>
+          </p:spPr>
+          <p:txBody>
+            <a:bodyPr/>
+            <a:lstStyle/>
+            <a:p>
+              <a:endParaRPr dirty="0"/>
+            </a:p>
+          </p:txBody>
+        </p:sp>
+        <p:grpSp>
+          <p:nvGrpSpPr>
+            <p:cNvPr id="26" name="Group 25">
+              <a:extLst>
+                <a:ext uri="{FF2B5EF4-FFF2-40B4-BE49-F238E27FC236}">
+                  <a16:creationId xmlns:a16="http://schemas.microsoft.com/office/drawing/2014/main" id="{79CD48BD-6A40-4DE2-8721-5B7D25520FA3}"/>
+                </a:ext>
+              </a:extLst>
+            </p:cNvPr>
+            <p:cNvGrpSpPr/>
+            <p:nvPr/>
+          </p:nvGrpSpPr>
+          <p:grpSpPr>
+            <a:xfrm>
+              <a:off x="3343275" y="1650718"/>
+              <a:ext cx="1024762" cy="1509755"/>
+              <a:chOff x="3343275" y="1650718"/>
+              <a:chExt cx="1024762" cy="1509755"/>
+            </a:xfrm>
+          </p:grpSpPr>
+          <p:grpSp>
+            <p:nvGrpSpPr>
+              <p:cNvPr id="27" name="Group 26">
+                <a:extLst>
+                  <a:ext uri="{FF2B5EF4-FFF2-40B4-BE49-F238E27FC236}">
+                    <a16:creationId xmlns:a16="http://schemas.microsoft.com/office/drawing/2014/main" id="{68E10FDC-58D3-4E13-83F4-471A54C867DD}"/>
+                  </a:ext>
+                </a:extLst>
+              </p:cNvPr>
+              <p:cNvGrpSpPr/>
+              <p:nvPr/>
+            </p:nvGrpSpPr>
+            <p:grpSpPr>
+              <a:xfrm>
+                <a:off x="3343275" y="1650718"/>
+                <a:ext cx="1024762" cy="405094"/>
+                <a:chOff x="3343275" y="1272350"/>
+                <a:chExt cx="1024762" cy="405094"/>
+              </a:xfrm>
+            </p:grpSpPr>
+            <p:sp>
+              <p:nvSpPr>
+                <p:cNvPr id="34" name="tx4">
+                  <a:extLst>
+                    <a:ext uri="{FF2B5EF4-FFF2-40B4-BE49-F238E27FC236}">
+                      <a16:creationId xmlns:a16="http://schemas.microsoft.com/office/drawing/2014/main" id="{B06A50C4-0D84-424E-9841-C30977231375}"/>
+                    </a:ext>
+                  </a:extLst>
+                </p:cNvPr>
+                <p:cNvSpPr/>
+                <p:nvPr/>
+              </p:nvSpPr>
+              <p:spPr>
+                <a:xfrm>
+                  <a:off x="3343275" y="1272350"/>
+                  <a:ext cx="1024762" cy="103342"/>
+                </a:xfrm>
+                <a:prstGeom prst="rect">
+                  <a:avLst/>
+                </a:prstGeom>
+                <a:noFill/>
+              </p:spPr>
+              <p:txBody>
+                <a:bodyPr wrap="none" lIns="0" tIns="0" rIns="0" bIns="0" anchor="ctr" anchorCtr="1"/>
+                <a:lstStyle/>
+                <a:p>
+                  <a:pPr marL="0" marR="0" indent="0" algn="l">
+                    <a:lnSpc>
+                      <a:spcPts val="1100"/>
+                    </a:lnSpc>
+                    <a:spcBef>
+                      <a:spcPts val="0"/>
+                    </a:spcBef>
+                    <a:spcAft>
+                      <a:spcPts val="0"/>
+                    </a:spcAft>
+                  </a:pPr>
+                  <a:r>
+                    <a:rPr sz="1100" dirty="0">
+                      <a:solidFill>
+                        <a:srgbClr val="000000">
+                          <a:alpha val="100000"/>
+                        </a:srgbClr>
+                      </a:solidFill>
+                      <a:latin typeface="Arial"/>
+                      <a:cs typeface="Arial"/>
+                    </a:rPr>
+                    <a:t>Number of times</a:t>
+                  </a:r>
+                </a:p>
+              </p:txBody>
+            </p:sp>
+            <p:sp>
+              <p:nvSpPr>
+                <p:cNvPr id="35" name="tx5">
+                  <a:extLst>
+                    <a:ext uri="{FF2B5EF4-FFF2-40B4-BE49-F238E27FC236}">
+                      <a16:creationId xmlns:a16="http://schemas.microsoft.com/office/drawing/2014/main" id="{50C476C6-B867-4288-A773-01C97840E719}"/>
+                    </a:ext>
+                  </a:extLst>
+                </p:cNvPr>
+                <p:cNvSpPr/>
+                <p:nvPr/>
+              </p:nvSpPr>
+              <p:spPr>
+                <a:xfrm>
+                  <a:off x="3343275" y="1424931"/>
+                  <a:ext cx="745362" cy="101637"/>
+                </a:xfrm>
+                <a:prstGeom prst="rect">
+                  <a:avLst/>
+                </a:prstGeom>
+                <a:noFill/>
+              </p:spPr>
+              <p:txBody>
+                <a:bodyPr wrap="none" lIns="0" tIns="0" rIns="0" bIns="0" anchor="ctr" anchorCtr="1"/>
+                <a:lstStyle/>
+                <a:p>
+                  <a:pPr marL="0" marR="0" indent="0" algn="l">
+                    <a:lnSpc>
+                      <a:spcPts val="1100"/>
+                    </a:lnSpc>
+                    <a:spcBef>
+                      <a:spcPts val="0"/>
+                    </a:spcBef>
+                    <a:spcAft>
+                      <a:spcPts val="0"/>
+                    </a:spcAft>
+                  </a:pPr>
+                  <a:r>
+                    <a:rPr sz="1100" dirty="0">
+                      <a:solidFill>
+                        <a:srgbClr val="000000">
+                          <a:alpha val="100000"/>
+                        </a:srgbClr>
+                      </a:solidFill>
+                      <a:latin typeface="Arial"/>
+                      <a:cs typeface="Arial"/>
+                    </a:rPr>
+                    <a:t>cited across</a:t>
+                  </a:r>
+                </a:p>
+              </p:txBody>
+            </p:sp>
+            <p:sp>
+              <p:nvSpPr>
+                <p:cNvPr id="36" name="tx6">
+                  <a:extLst>
+                    <a:ext uri="{FF2B5EF4-FFF2-40B4-BE49-F238E27FC236}">
+                      <a16:creationId xmlns:a16="http://schemas.microsoft.com/office/drawing/2014/main" id="{972FEE7C-DA7D-4D56-988F-8DAEF5A0D08B}"/>
+                    </a:ext>
+                  </a:extLst>
+                </p:cNvPr>
+                <p:cNvSpPr/>
+                <p:nvPr/>
+              </p:nvSpPr>
+              <p:spPr>
+                <a:xfrm>
+                  <a:off x="3343275" y="1546339"/>
+                  <a:ext cx="877490" cy="131105"/>
+                </a:xfrm>
+                <a:prstGeom prst="rect">
+                  <a:avLst/>
+                </a:prstGeom>
+                <a:noFill/>
+              </p:spPr>
+              <p:txBody>
+                <a:bodyPr wrap="none" lIns="0" tIns="0" rIns="0" bIns="0" anchor="ctr" anchorCtr="1"/>
+                <a:lstStyle/>
+                <a:p>
+                  <a:pPr marL="0" marR="0" indent="0" algn="l">
+                    <a:lnSpc>
+                      <a:spcPts val="1100"/>
+                    </a:lnSpc>
+                    <a:spcBef>
+                      <a:spcPts val="0"/>
+                    </a:spcBef>
+                    <a:spcAft>
+                      <a:spcPts val="0"/>
+                    </a:spcAft>
+                  </a:pPr>
+                  <a:r>
+                    <a:rPr sz="1100">
+                      <a:solidFill>
+                        <a:srgbClr val="000000">
+                          <a:alpha val="100000"/>
+                        </a:srgbClr>
+                      </a:solidFill>
+                      <a:latin typeface="Arial"/>
+                      <a:cs typeface="Arial"/>
+                    </a:rPr>
+                    <a:t>guidelines (n):</a:t>
+                  </a:r>
+                </a:p>
+              </p:txBody>
+            </p:sp>
+          </p:grpSp>
+          <p:sp>
+            <p:nvSpPr>
+              <p:cNvPr id="28" name="pt11">
+                <a:extLst>
+                  <a:ext uri="{FF2B5EF4-FFF2-40B4-BE49-F238E27FC236}">
+                    <a16:creationId xmlns:a16="http://schemas.microsoft.com/office/drawing/2014/main" id="{0A80790F-5AB2-4C6B-9836-881B77063EAA}"/>
+                  </a:ext>
+                </a:extLst>
+              </p:cNvPr>
+              <p:cNvSpPr/>
+              <p:nvPr/>
+            </p:nvSpPr>
+            <p:spPr>
+              <a:xfrm>
+                <a:off x="3373457" y="2775116"/>
+                <a:ext cx="180000" cy="180000"/>
+              </a:xfrm>
+              <a:prstGeom prst="ellipse">
+                <a:avLst/>
+              </a:prstGeom>
+              <a:solidFill>
+                <a:srgbClr val="FEE08B">
+                  <a:alpha val="100000"/>
+                </a:srgbClr>
+              </a:solidFill>
+              <a:ln w="9000" cap="rnd">
+                <a:solidFill>
+                  <a:srgbClr val="FEE08B">
+                    <a:alpha val="100000"/>
+                  </a:srgbClr>
+                </a:solidFill>
+                <a:prstDash val="solid"/>
+                <a:round/>
+              </a:ln>
+            </p:spPr>
+            <p:txBody>
+              <a:bodyPr/>
+              <a:lstStyle/>
+              <a:p>
+                <a:endParaRPr/>
+              </a:p>
+            </p:txBody>
+          </p:sp>
+          <p:sp>
+            <p:nvSpPr>
+              <p:cNvPr id="29" name="pt12">
+                <a:extLst>
+                  <a:ext uri="{FF2B5EF4-FFF2-40B4-BE49-F238E27FC236}">
+                    <a16:creationId xmlns:a16="http://schemas.microsoft.com/office/drawing/2014/main" id="{345CB360-DED1-4F0B-B331-C4CF0FA8729E}"/>
+                  </a:ext>
+                </a:extLst>
+              </p:cNvPr>
+              <p:cNvSpPr/>
+              <p:nvPr/>
+            </p:nvSpPr>
+            <p:spPr>
+              <a:xfrm>
+                <a:off x="3361061" y="2475543"/>
+                <a:ext cx="216000" cy="216000"/>
+              </a:xfrm>
+              <a:prstGeom prst="ellipse">
+                <a:avLst/>
+              </a:prstGeom>
+              <a:solidFill>
+                <a:srgbClr val="FDAE61">
+                  <a:alpha val="100000"/>
+                </a:srgbClr>
+              </a:solidFill>
+              <a:ln w="9000" cap="rnd">
+                <a:solidFill>
+                  <a:srgbClr val="FDAE61">
+                    <a:alpha val="100000"/>
+                  </a:srgbClr>
+                </a:solidFill>
+                <a:prstDash val="solid"/>
+                <a:round/>
+              </a:ln>
+            </p:spPr>
+            <p:txBody>
+              <a:bodyPr/>
+              <a:lstStyle/>
+              <a:p>
+                <a:endParaRPr/>
+              </a:p>
+            </p:txBody>
+          </p:sp>
+          <p:sp>
+            <p:nvSpPr>
+              <p:cNvPr id="30" name="tx19">
+                <a:extLst>
+                  <a:ext uri="{FF2B5EF4-FFF2-40B4-BE49-F238E27FC236}">
+                    <a16:creationId xmlns:a16="http://schemas.microsoft.com/office/drawing/2014/main" id="{3A956FA7-83CB-4EF1-BE7D-47A92DD00630}"/>
+                  </a:ext>
+                </a:extLst>
+              </p:cNvPr>
+              <p:cNvSpPr/>
+              <p:nvPr/>
+            </p:nvSpPr>
+            <p:spPr>
+              <a:xfrm>
+                <a:off x="3656854" y="3055589"/>
+                <a:ext cx="291951" cy="104884"/>
+              </a:xfrm>
+              <a:prstGeom prst="rect">
+                <a:avLst/>
+              </a:prstGeom>
+              <a:noFill/>
+            </p:spPr>
+            <p:txBody>
+              <a:bodyPr wrap="none" lIns="0" tIns="0" rIns="0" bIns="0" anchor="ctr" anchorCtr="1"/>
+              <a:lstStyle/>
+              <a:p>
+                <a:pPr marL="0" marR="0" indent="0" algn="l">
+                  <a:lnSpc>
+                    <a:spcPts val="880"/>
+                  </a:lnSpc>
+                  <a:spcBef>
+                    <a:spcPts val="0"/>
+                  </a:spcBef>
+                  <a:spcAft>
+                    <a:spcPts val="0"/>
+                  </a:spcAft>
+                </a:pPr>
+                <a:r>
+                  <a:rPr lang="en-GB" sz="880" dirty="0">
+                    <a:solidFill>
+                      <a:srgbClr val="000000">
+                        <a:alpha val="100000"/>
+                      </a:srgbClr>
+                    </a:solidFill>
+                    <a:latin typeface="Arial"/>
+                    <a:cs typeface="Arial"/>
+                  </a:rPr>
+                  <a:t>3</a:t>
+                </a:r>
+                <a:r>
+                  <a:rPr sz="880" dirty="0">
+                    <a:solidFill>
+                      <a:srgbClr val="000000">
+                        <a:alpha val="100000"/>
+                      </a:srgbClr>
+                    </a:solidFill>
+                    <a:latin typeface="Arial"/>
+                    <a:cs typeface="Arial"/>
+                  </a:rPr>
+                  <a:t> (</a:t>
+                </a:r>
+                <a:r>
+                  <a:rPr lang="en-GB" sz="880" dirty="0">
+                    <a:solidFill>
+                      <a:srgbClr val="000000">
+                        <a:alpha val="100000"/>
+                      </a:srgbClr>
+                    </a:solidFill>
+                    <a:latin typeface="Arial"/>
+                    <a:cs typeface="Arial"/>
+                  </a:rPr>
+                  <a:t>36</a:t>
+                </a:r>
+                <a:r>
+                  <a:rPr sz="880" dirty="0">
+                    <a:solidFill>
+                      <a:srgbClr val="000000">
+                        <a:alpha val="100000"/>
+                      </a:srgbClr>
+                    </a:solidFill>
+                    <a:latin typeface="Arial"/>
+                    <a:cs typeface="Arial"/>
+                  </a:rPr>
+                  <a:t>)</a:t>
+                </a:r>
+              </a:p>
+            </p:txBody>
+          </p:sp>
+          <p:sp>
+            <p:nvSpPr>
+              <p:cNvPr id="31" name="tx20">
+                <a:extLst>
+                  <a:ext uri="{FF2B5EF4-FFF2-40B4-BE49-F238E27FC236}">
+                    <a16:creationId xmlns:a16="http://schemas.microsoft.com/office/drawing/2014/main" id="{DBA39BF3-FB59-4659-AAE7-A1A3EFBF6B5F}"/>
+                  </a:ext>
+                </a:extLst>
+              </p:cNvPr>
+              <p:cNvSpPr/>
+              <p:nvPr/>
+            </p:nvSpPr>
+            <p:spPr>
+              <a:xfrm>
+                <a:off x="3691698" y="2812674"/>
+                <a:ext cx="229795" cy="104884"/>
+              </a:xfrm>
+              <a:prstGeom prst="rect">
+                <a:avLst/>
+              </a:prstGeom>
+              <a:noFill/>
+            </p:spPr>
+            <p:txBody>
+              <a:bodyPr wrap="none" lIns="0" tIns="0" rIns="0" bIns="0" anchor="ctr" anchorCtr="1"/>
+              <a:lstStyle/>
+              <a:p>
+                <a:pPr marL="0" marR="0" indent="0" algn="l">
+                  <a:lnSpc>
+                    <a:spcPts val="880"/>
+                  </a:lnSpc>
+                  <a:spcBef>
+                    <a:spcPts val="0"/>
+                  </a:spcBef>
+                  <a:spcAft>
+                    <a:spcPts val="0"/>
+                  </a:spcAft>
+                </a:pPr>
+                <a:r>
+                  <a:rPr lang="en-GB" sz="880" dirty="0">
+                    <a:solidFill>
+                      <a:srgbClr val="000000">
+                        <a:alpha val="100000"/>
+                      </a:srgbClr>
+                    </a:solidFill>
+                    <a:latin typeface="Arial"/>
+                    <a:cs typeface="Arial"/>
+                  </a:rPr>
+                  <a:t>4</a:t>
+                </a:r>
+                <a:r>
+                  <a:rPr sz="880" dirty="0">
+                    <a:solidFill>
+                      <a:srgbClr val="000000">
+                        <a:alpha val="100000"/>
+                      </a:srgbClr>
+                    </a:solidFill>
+                    <a:latin typeface="Arial"/>
+                    <a:cs typeface="Arial"/>
+                  </a:rPr>
+                  <a:t> (</a:t>
+                </a:r>
+                <a:r>
+                  <a:rPr lang="en-GB" sz="880" dirty="0">
+                    <a:solidFill>
+                      <a:srgbClr val="000000">
+                        <a:alpha val="100000"/>
+                      </a:srgbClr>
+                    </a:solidFill>
+                    <a:latin typeface="Arial"/>
+                    <a:cs typeface="Arial"/>
+                  </a:rPr>
+                  <a:t>13</a:t>
+                </a:r>
+                <a:r>
+                  <a:rPr sz="880" dirty="0">
+                    <a:solidFill>
+                      <a:srgbClr val="000000">
+                        <a:alpha val="100000"/>
+                      </a:srgbClr>
+                    </a:solidFill>
+                    <a:latin typeface="Arial"/>
+                    <a:cs typeface="Arial"/>
+                  </a:rPr>
+                  <a:t>)</a:t>
+                </a:r>
+              </a:p>
+            </p:txBody>
+          </p:sp>
+          <p:sp>
+            <p:nvSpPr>
+              <p:cNvPr id="32" name="tx21">
+                <a:extLst>
+                  <a:ext uri="{FF2B5EF4-FFF2-40B4-BE49-F238E27FC236}">
+                    <a16:creationId xmlns:a16="http://schemas.microsoft.com/office/drawing/2014/main" id="{AB7A7E2C-254A-4672-AE29-ABF7C92A72AE}"/>
+                  </a:ext>
+                </a:extLst>
+              </p:cNvPr>
+              <p:cNvSpPr/>
+              <p:nvPr/>
+            </p:nvSpPr>
+            <p:spPr>
+              <a:xfrm>
+                <a:off x="3687931" y="2528175"/>
+                <a:ext cx="229795" cy="110735"/>
+              </a:xfrm>
+              <a:prstGeom prst="rect">
+                <a:avLst/>
+              </a:prstGeom>
+              <a:noFill/>
+            </p:spPr>
+            <p:txBody>
+              <a:bodyPr wrap="none" lIns="0" tIns="0" rIns="0" bIns="0" anchor="ctr" anchorCtr="1"/>
+              <a:lstStyle/>
+              <a:p>
+                <a:pPr marL="0" marR="0" indent="0" algn="l">
+                  <a:lnSpc>
+                    <a:spcPts val="880"/>
+                  </a:lnSpc>
+                  <a:spcBef>
+                    <a:spcPts val="0"/>
+                  </a:spcBef>
+                  <a:spcAft>
+                    <a:spcPts val="0"/>
+                  </a:spcAft>
+                </a:pPr>
+                <a:r>
+                  <a:rPr lang="en-GB" sz="880" dirty="0">
+                    <a:solidFill>
+                      <a:srgbClr val="000000">
+                        <a:alpha val="100000"/>
+                      </a:srgbClr>
+                    </a:solidFill>
+                    <a:latin typeface="Arial"/>
+                    <a:cs typeface="Arial"/>
+                  </a:rPr>
+                  <a:t>5</a:t>
+                </a:r>
+                <a:r>
+                  <a:rPr sz="880" dirty="0">
+                    <a:solidFill>
+                      <a:srgbClr val="000000">
+                        <a:alpha val="100000"/>
+                      </a:srgbClr>
+                    </a:solidFill>
+                    <a:latin typeface="Arial"/>
+                    <a:cs typeface="Arial"/>
+                  </a:rPr>
+                  <a:t> (2)</a:t>
+                </a:r>
+              </a:p>
+            </p:txBody>
+          </p:sp>
+          <p:sp>
+            <p:nvSpPr>
+              <p:cNvPr id="33" name="tx22">
+                <a:extLst>
+                  <a:ext uri="{FF2B5EF4-FFF2-40B4-BE49-F238E27FC236}">
+                    <a16:creationId xmlns:a16="http://schemas.microsoft.com/office/drawing/2014/main" id="{CA9778BA-4359-4E82-8021-9FB585FE751C}"/>
+                  </a:ext>
+                </a:extLst>
+              </p:cNvPr>
+              <p:cNvSpPr/>
+              <p:nvPr/>
+            </p:nvSpPr>
+            <p:spPr>
+              <a:xfrm>
+                <a:off x="3687931" y="2216731"/>
+                <a:ext cx="229795" cy="104884"/>
+              </a:xfrm>
+              <a:prstGeom prst="rect">
+                <a:avLst/>
+              </a:prstGeom>
+              <a:noFill/>
+            </p:spPr>
+            <p:txBody>
+              <a:bodyPr wrap="none" lIns="0" tIns="0" rIns="0" bIns="0" anchor="ctr" anchorCtr="1"/>
+              <a:lstStyle/>
+              <a:p>
+                <a:pPr marL="0" marR="0" indent="0" algn="l">
+                  <a:lnSpc>
+                    <a:spcPts val="880"/>
+                  </a:lnSpc>
+                  <a:spcBef>
+                    <a:spcPts val="0"/>
+                  </a:spcBef>
+                  <a:spcAft>
+                    <a:spcPts val="0"/>
+                  </a:spcAft>
+                </a:pPr>
+                <a:r>
+                  <a:rPr lang="en-GB" sz="880" dirty="0">
+                    <a:solidFill>
+                      <a:srgbClr val="000000">
+                        <a:alpha val="100000"/>
+                      </a:srgbClr>
+                    </a:solidFill>
+                    <a:latin typeface="Arial"/>
+                    <a:cs typeface="Arial"/>
+                  </a:rPr>
+                  <a:t>6</a:t>
+                </a:r>
+                <a:r>
+                  <a:rPr sz="880" dirty="0">
+                    <a:solidFill>
+                      <a:srgbClr val="000000">
+                        <a:alpha val="100000"/>
+                      </a:srgbClr>
+                    </a:solidFill>
+                    <a:latin typeface="Arial"/>
+                    <a:cs typeface="Arial"/>
+                  </a:rPr>
+                  <a:t> (</a:t>
+                </a:r>
+                <a:r>
+                  <a:rPr lang="en-GB" sz="880" dirty="0">
+                    <a:solidFill>
+                      <a:srgbClr val="000000">
+                        <a:alpha val="100000"/>
+                      </a:srgbClr>
+                    </a:solidFill>
+                    <a:latin typeface="Arial"/>
+                    <a:cs typeface="Arial"/>
+                  </a:rPr>
+                  <a:t>2</a:t>
+                </a:r>
+                <a:r>
+                  <a:rPr sz="880" dirty="0">
+                    <a:solidFill>
+                      <a:srgbClr val="000000">
+                        <a:alpha val="100000"/>
+                      </a:srgbClr>
+                    </a:solidFill>
+                    <a:latin typeface="Arial"/>
+                    <a:cs typeface="Arial"/>
+                  </a:rPr>
+                  <a:t>)</a:t>
+                </a:r>
+              </a:p>
+            </p:txBody>
+          </p:sp>
+        </p:grpSp>
+      </p:grpSp>
     </p:spTree>
     <p:extLst>
       <p:ext uri="{BB962C8B-B14F-4D97-AF65-F5344CB8AC3E}">

</xml_diff>